<commit_message>
michaels ideas complete, entwurf chapter complete, new pictures, new mvvm design ...
</commit_message>
<xml_diff>
--- a/images/merlin_architektur.pptx
+++ b/images/merlin_architektur.pptx
@@ -4966,7 +4966,7 @@
           <p:spPr>
             <a:xfrm>
               <a:off x="3239852" y="3212976"/>
-              <a:ext cx="2664296" cy="432048"/>
+              <a:ext cx="2772308" cy="432048"/>
             </a:xfrm>
             <a:prstGeom prst="rect">
               <a:avLst/>
@@ -5022,7 +5022,7 @@
         </p:nvGrpSpPr>
         <p:grpSpPr>
           <a:xfrm>
-            <a:off x="6084168" y="2564904"/>
+            <a:off x="3431690" y="2492896"/>
             <a:ext cx="1512168" cy="1080120"/>
             <a:chOff x="6156176" y="3140968"/>
             <a:chExt cx="1512168" cy="1080120"/>
@@ -5196,7 +5196,7 @@
         <p:spPr>
           <a:xfrm>
             <a:off x="3347864" y="4740018"/>
-            <a:ext cx="1584176" cy="576064"/>
+            <a:ext cx="1656184" cy="576064"/>
           </a:xfrm>
           <a:prstGeom prst="rect">
             <a:avLst/>
@@ -5275,7 +5275,7 @@
         <p:spPr>
           <a:xfrm>
             <a:off x="2771800" y="4019938"/>
-            <a:ext cx="2736304" cy="432048"/>
+            <a:ext cx="2808312" cy="432048"/>
           </a:xfrm>
           <a:prstGeom prst="rect">
             <a:avLst/>
@@ -5418,7 +5418,7 @@
         </p:nvSpPr>
         <p:spPr>
           <a:xfrm>
-            <a:off x="7668344" y="2924944"/>
+            <a:off x="539552" y="2708920"/>
             <a:ext cx="1284326" cy="369332"/>
           </a:xfrm>
           <a:prstGeom prst="rect">
@@ -5445,14 +5445,14 @@
           <p:cNvPr id="24" name="Gerade Verbindung mit Pfeil 23"/>
           <p:cNvCxnSpPr>
             <a:stCxn id="10" idx="3"/>
-            <a:endCxn id="13" idx="3"/>
+            <a:endCxn id="13" idx="0"/>
           </p:cNvCxnSpPr>
           <p:nvPr/>
         </p:nvCxnSpPr>
         <p:spPr>
           <a:xfrm flipH="1">
-            <a:off x="5508104" y="3500189"/>
-            <a:ext cx="1332632" cy="735773"/>
+            <a:off x="4175956" y="3428181"/>
+            <a:ext cx="12302" cy="591757"/>
           </a:xfrm>
           <a:prstGeom prst="straightConnector1">
             <a:avLst/>
@@ -5461,8 +5461,8 @@
             <a:solidFill>
               <a:schemeClr val="tx1"/>
             </a:solidFill>
-            <a:headEnd type="triangle"/>
-            <a:tailEnd type="none"/>
+            <a:headEnd type="none"/>
+            <a:tailEnd type="arrow"/>
           </a:ln>
         </p:spPr>
         <p:style>
@@ -5485,14 +5485,14 @@
           <p:cNvPr id="28" name="Gerade Verbindung mit Pfeil 27"/>
           <p:cNvCxnSpPr>
             <a:stCxn id="10" idx="1"/>
-            <a:endCxn id="7" idx="3"/>
+            <a:endCxn id="7" idx="2"/>
           </p:cNvCxnSpPr>
           <p:nvPr/>
         </p:nvCxnSpPr>
         <p:spPr>
-          <a:xfrm flipH="1" flipV="1">
-            <a:off x="5472100" y="1901957"/>
-            <a:ext cx="1368636" cy="734955"/>
+          <a:xfrm flipV="1">
+            <a:off x="4188258" y="2117981"/>
+            <a:ext cx="5700" cy="446923"/>
           </a:xfrm>
           <a:prstGeom prst="straightConnector1">
             <a:avLst/>
@@ -5501,7 +5501,7 @@
             <a:solidFill>
               <a:schemeClr val="tx1"/>
             </a:solidFill>
-            <a:headEnd type="triangle"/>
+            <a:headEnd type="arrow"/>
             <a:tailEnd type="none"/>
           </a:ln>
         </p:spPr>
@@ -5531,7 +5531,7 @@
         </p:nvCxnSpPr>
         <p:spPr>
           <a:xfrm flipV="1">
-            <a:off x="4139952" y="4451986"/>
+            <a:off x="4175956" y="4451986"/>
             <a:ext cx="0" cy="288032"/>
           </a:xfrm>
           <a:prstGeom prst="straightConnector1">
@@ -5541,48 +5541,8 @@
             <a:solidFill>
               <a:schemeClr val="tx1"/>
             </a:solidFill>
-            <a:headEnd type="triangle"/>
-            <a:tailEnd type="triangle"/>
-          </a:ln>
-        </p:spPr>
-        <p:style>
-          <a:lnRef idx="1">
-            <a:schemeClr val="accent1"/>
-          </a:lnRef>
-          <a:fillRef idx="0">
-            <a:schemeClr val="accent1"/>
-          </a:fillRef>
-          <a:effectRef idx="0">
-            <a:schemeClr val="accent1"/>
-          </a:effectRef>
-          <a:fontRef idx="minor">
-            <a:schemeClr val="tx1"/>
-          </a:fontRef>
-        </p:style>
-      </p:cxnSp>
-      <p:cxnSp>
-        <p:nvCxnSpPr>
-          <p:cNvPr id="34" name="Gerade Verbindung mit Pfeil 33"/>
-          <p:cNvCxnSpPr>
-            <a:stCxn id="13" idx="0"/>
-            <a:endCxn id="7" idx="2"/>
-          </p:cNvCxnSpPr>
-          <p:nvPr/>
-        </p:nvCxnSpPr>
-        <p:spPr>
-          <a:xfrm flipV="1">
-            <a:off x="4139952" y="2117981"/>
-            <a:ext cx="0" cy="1901957"/>
-          </a:xfrm>
-          <a:prstGeom prst="straightConnector1">
-            <a:avLst/>
-          </a:prstGeom>
-          <a:ln w="25400">
-            <a:solidFill>
-              <a:schemeClr val="tx1"/>
-            </a:solidFill>
-            <a:headEnd type="triangle"/>
-            <a:tailEnd type="triangle"/>
+            <a:headEnd type="arrow"/>
+            <a:tailEnd type="arrow"/>
           </a:ln>
         </p:spPr>
         <p:style>
@@ -5826,79 +5786,6 @@
                                         <p:cTn id="16" dur="500" fill="hold"/>
                                         <p:tgtEl>
                                           <p:spTgt spid="31"/>
-                                        </p:tgtEl>
-                                        <p:attrNameLst>
-                                          <p:attrName>ppt_y</p:attrName>
-                                        </p:attrNameLst>
-                                      </p:cBhvr>
-                                      <p:tavLst>
-                                        <p:tav tm="0">
-                                          <p:val>
-                                            <p:strVal val="1+#ppt_h/2"/>
-                                          </p:val>
-                                        </p:tav>
-                                        <p:tav tm="100000">
-                                          <p:val>
-                                            <p:strVal val="#ppt_y"/>
-                                          </p:val>
-                                        </p:tav>
-                                      </p:tavLst>
-                                    </p:anim>
-                                  </p:childTnLst>
-                                </p:cTn>
-                              </p:par>
-                              <p:par>
-                                <p:cTn id="17" presetID="2" presetClass="entr" presetSubtype="4" fill="hold" nodeType="withEffect">
-                                  <p:stCondLst>
-                                    <p:cond delay="0"/>
-                                  </p:stCondLst>
-                                  <p:childTnLst>
-                                    <p:set>
-                                      <p:cBhvr>
-                                        <p:cTn id="18" dur="1" fill="hold">
-                                          <p:stCondLst>
-                                            <p:cond delay="0"/>
-                                          </p:stCondLst>
-                                        </p:cTn>
-                                        <p:tgtEl>
-                                          <p:spTgt spid="34"/>
-                                        </p:tgtEl>
-                                        <p:attrNameLst>
-                                          <p:attrName>style.visibility</p:attrName>
-                                        </p:attrNameLst>
-                                      </p:cBhvr>
-                                      <p:to>
-                                        <p:strVal val="visible"/>
-                                      </p:to>
-                                    </p:set>
-                                    <p:anim calcmode="lin" valueType="num">
-                                      <p:cBhvr additive="base">
-                                        <p:cTn id="19" dur="500" fill="hold"/>
-                                        <p:tgtEl>
-                                          <p:spTgt spid="34"/>
-                                        </p:tgtEl>
-                                        <p:attrNameLst>
-                                          <p:attrName>ppt_x</p:attrName>
-                                        </p:attrNameLst>
-                                      </p:cBhvr>
-                                      <p:tavLst>
-                                        <p:tav tm="0">
-                                          <p:val>
-                                            <p:strVal val="#ppt_x"/>
-                                          </p:val>
-                                        </p:tav>
-                                        <p:tav tm="100000">
-                                          <p:val>
-                                            <p:strVal val="#ppt_x"/>
-                                          </p:val>
-                                        </p:tav>
-                                      </p:tavLst>
-                                    </p:anim>
-                                    <p:anim calcmode="lin" valueType="num">
-                                      <p:cBhvr additive="base">
-                                        <p:cTn id="20" dur="500" fill="hold"/>
-                                        <p:tgtEl>
-                                          <p:spTgt spid="34"/>
                                         </p:tgtEl>
                                         <p:attrNameLst>
                                           <p:attrName>ppt_y</p:attrName>

</xml_diff>